<commit_message>
organized example keys, added second private-public pair, made symmetric key, and wrote up symmetric key walkthrough in notebook
</commit_message>
<xml_diff>
--- a/digital_security_strikeU.pptx
+++ b/digital_security_strikeU.pptx
@@ -5384,10 +5384,63 @@
             <p:ph idx="1"/>
           </p:nvPr>
         </p:nvSpPr>
-        <p:spPr/>
+        <p:spPr>
+          <a:xfrm>
+            <a:off x="838200" y="1690688"/>
+            <a:ext cx="10515600" cy="4351338"/>
+          </a:xfrm>
+        </p:spPr>
         <p:txBody>
           <a:bodyPr/>
           <a:lstStyle/>
+          <a:p>
+            <a:pPr>
+              <a:spcAft>
+                <a:spcPts val="600"/>
+              </a:spcAft>
+              <a:buFont typeface="Wingdings" panose="05000000000000000000" pitchFamily="2" charset="2"/>
+              <a:buChar char="§"/>
+            </a:pPr>
+            <a:r>
+              <a:rPr lang="en-US" dirty="0">
+                <a:latin typeface="Helvetica LT Std" panose="020B0504020202020204" pitchFamily="34" charset="0"/>
+              </a:rPr>
+              <a:t>Now that you’re experts, let’s get some hands on practice with these concepts.</a:t>
+            </a:r>
+          </a:p>
+          <a:p>
+            <a:pPr>
+              <a:spcAft>
+                <a:spcPts val="600"/>
+              </a:spcAft>
+              <a:buFont typeface="Wingdings" panose="05000000000000000000" pitchFamily="2" charset="2"/>
+              <a:buChar char="§"/>
+            </a:pPr>
+            <a:r>
+              <a:rPr lang="en-US" dirty="0">
+                <a:latin typeface="Helvetica LT Std" panose="020B0504020202020204" pitchFamily="34" charset="0"/>
+              </a:rPr>
+              <a:t>Go follow this link to get started:</a:t>
+            </a:r>
+          </a:p>
+          <a:p>
+            <a:pPr marL="0" indent="0">
+              <a:buNone/>
+            </a:pPr>
+            <a:r>
+              <a:rPr lang="en-US" dirty="0">
+                <a:latin typeface="Helvetica LT Std" panose="020B0504020202020204" pitchFamily="34" charset="0"/>
+                <a:hlinkClick r:id="rId2"/>
+              </a:rPr>
+              <a:t>https://mybinder.org/v2/gh/sarttiso/digital-security/1766ea208d0226cd4229a42530c024a35b7eeb3d</a:t>
+            </a:r>
+            <a:r>
+              <a:rPr lang="en-US" dirty="0">
+                <a:latin typeface="Helvetica LT Std" panose="020B0504020202020204" pitchFamily="34" charset="0"/>
+              </a:rPr>
+              <a:t> </a:t>
+            </a:r>
+          </a:p>
           <a:p>
             <a:pPr>
               <a:buFont typeface="Wingdings" panose="05000000000000000000" pitchFamily="2" charset="2"/>
@@ -5397,11 +5450,65 @@
               <a:rPr lang="en-US" dirty="0">
                 <a:latin typeface="Helvetica LT Std" panose="020B0504020202020204" pitchFamily="34" charset="0"/>
               </a:rPr>
-              <a:t>Now that you’re experts, let’s get some hands on practice with these concepts.</a:t>
-            </a:r>
-          </a:p>
-        </p:txBody>
-      </p:sp>
+              <a:t>Once it’s open, click on the </a:t>
+            </a:r>
+            <a:r>
+              <a:rPr lang="en-US" i="1" dirty="0">
+                <a:latin typeface="Helvetica LT Std" panose="020B0504020202020204" pitchFamily="34" charset="0"/>
+              </a:rPr>
+              <a:t>hands-</a:t>
+            </a:r>
+            <a:r>
+              <a:rPr lang="en-US" i="1" dirty="0" err="1">
+                <a:latin typeface="Helvetica LT Std" panose="020B0504020202020204" pitchFamily="34" charset="0"/>
+              </a:rPr>
+              <a:t>on.ipynb</a:t>
+            </a:r>
+            <a:r>
+              <a:rPr lang="en-US" i="1" dirty="0">
+                <a:latin typeface="Helvetica LT Std" panose="020B0504020202020204" pitchFamily="34" charset="0"/>
+              </a:rPr>
+              <a:t> </a:t>
+            </a:r>
+            <a:r>
+              <a:rPr lang="en-US" dirty="0">
+                <a:latin typeface="Helvetica LT Std" panose="020B0504020202020204" pitchFamily="34" charset="0"/>
+              </a:rPr>
+              <a:t>file</a:t>
+            </a:r>
+          </a:p>
+        </p:txBody>
+      </p:sp>
+      <p:pic>
+        <p:nvPicPr>
+          <p:cNvPr id="4" name="Picture 3">
+            <a:extLst>
+              <a:ext uri="{FF2B5EF4-FFF2-40B4-BE49-F238E27FC236}">
+                <a16:creationId xmlns:a16="http://schemas.microsoft.com/office/drawing/2014/main" id="{5C327A45-91BC-480E-8A7B-606945A6BCE4}"/>
+              </a:ext>
+            </a:extLst>
+          </p:cNvPr>
+          <p:cNvPicPr>
+            <a:picLocks noChangeAspect="1"/>
+          </p:cNvPicPr>
+          <p:nvPr/>
+        </p:nvPicPr>
+        <p:blipFill>
+          <a:blip r:embed="rId3"/>
+          <a:stretch>
+            <a:fillRect/>
+          </a:stretch>
+        </p:blipFill>
+        <p:spPr>
+          <a:xfrm>
+            <a:off x="1727912" y="4760146"/>
+            <a:ext cx="8736176" cy="1997054"/>
+          </a:xfrm>
+          <a:prstGeom prst="rect">
+            <a:avLst/>
+          </a:prstGeom>
+        </p:spPr>
+      </p:pic>
     </p:spTree>
     <p:extLst>
       <p:ext uri="{BB962C8B-B14F-4D97-AF65-F5344CB8AC3E}">

</xml_diff>

<commit_message>
added new binder link to presentation
</commit_message>
<xml_diff>
--- a/digital_security_strikeU.pptx
+++ b/digital_security_strikeU.pptx
@@ -6771,13 +6771,13 @@
         </p:nvSpPr>
         <p:spPr>
           <a:xfrm>
-            <a:off x="838200" y="1690688"/>
-            <a:ext cx="5800200" cy="4351338"/>
+            <a:off x="303000" y="1755945"/>
+            <a:ext cx="6745800" cy="4802187"/>
           </a:xfrm>
         </p:spPr>
         <p:txBody>
           <a:bodyPr>
-            <a:normAutofit fontScale="92500"/>
+            <a:normAutofit/>
           </a:bodyPr>
           <a:lstStyle/>
           <a:p>
@@ -6807,7 +6807,7 @@
               <a:rPr lang="en-US" dirty="0">
                 <a:latin typeface="Helvetica LT Std" panose="020B0504020202020204" pitchFamily="34" charset="0"/>
               </a:rPr>
-              <a:t>Go follow this link to get started:</a:t>
+              <a:t>Follow this link to get started:</a:t>
             </a:r>
           </a:p>
           <a:p>
@@ -6819,23 +6819,13 @@
                 <a:latin typeface="Helvetica LT Std" panose="020B0504020202020204" pitchFamily="34" charset="0"/>
                 <a:hlinkClick r:id="rId2"/>
               </a:rPr>
-              <a:t>https://mybinder.org/v2/gh/sarttiso/digital-security/1766ea208d0226cd4229a42530c024a35b7eeb3d</a:t>
-            </a:r>
-            <a:r>
-              <a:rPr lang="en-US" altLang="en-US" dirty="0">
-                <a:latin typeface="Arial Unicode MS"/>
-              </a:rPr>
-              <a:t>?urlpath=lab</a:t>
-            </a:r>
-            <a:r>
-              <a:rPr lang="en-US" altLang="en-US" sz="800" dirty="0"/>
-              <a:t> </a:t>
-            </a:r>
-            <a:r>
-              <a:rPr lang="en-US" dirty="0">
-                <a:latin typeface="Helvetica LT Std" panose="020B0504020202020204" pitchFamily="34" charset="0"/>
-              </a:rPr>
-              <a:t> </a:t>
+              <a:t>https://mybinder.org/v2/gh/sarttiso/digital-security/b887b43bf6206c874b090000a0cd14000318644e?urlpath=lab</a:t>
+            </a:r>
+            <a:r>
+              <a:rPr lang="en-US" dirty="0">
+                <a:latin typeface="Helvetica LT Std" panose="020B0504020202020204" pitchFamily="34" charset="0"/>
+              </a:rPr>
+              <a:t>  </a:t>
             </a:r>
           </a:p>
           <a:p>
@@ -6847,7 +6837,19 @@
               <a:rPr lang="en-US" dirty="0">
                 <a:latin typeface="Helvetica LT Std" panose="020B0504020202020204" pitchFamily="34" charset="0"/>
               </a:rPr>
-              <a:t>Once it’s open, click on the </a:t>
+              <a:t>Things will spin for a little while (up to a minute or so), wait until that finishes</a:t>
+            </a:r>
+          </a:p>
+          <a:p>
+            <a:pPr>
+              <a:buFont typeface="Wingdings" panose="05000000000000000000" pitchFamily="2" charset="2"/>
+              <a:buChar char="§"/>
+            </a:pPr>
+            <a:r>
+              <a:rPr lang="en-US" dirty="0">
+                <a:latin typeface="Helvetica LT Std" panose="020B0504020202020204" pitchFamily="34" charset="0"/>
+              </a:rPr>
+              <a:t>Once it’s done, click on the </a:t>
             </a:r>
             <a:r>
               <a:rPr lang="en-US" i="1" dirty="0">
@@ -6890,16 +6892,15 @@
           </p:cNvPicPr>
           <p:nvPr/>
         </p:nvPicPr>
-        <p:blipFill>
+        <p:blipFill rotWithShape="1">
           <a:blip r:embed="rId3"/>
-          <a:stretch>
-            <a:fillRect/>
-          </a:stretch>
+          <a:srcRect r="10450"/>
+          <a:stretch/>
         </p:blipFill>
         <p:spPr>
           <a:xfrm>
-            <a:off x="6718761" y="2131201"/>
-            <a:ext cx="5362844" cy="3475362"/>
+            <a:off x="7207200" y="1876820"/>
+            <a:ext cx="4984800" cy="3607343"/>
           </a:xfrm>
           <a:prstGeom prst="rect">
             <a:avLst/>

</xml_diff>

<commit_message>
added figure on salting
</commit_message>
<xml_diff>
--- a/digital_security_strikeU.pptx
+++ b/digital_security_strikeU.pptx
@@ -7054,7 +7054,7 @@
           <p:nvPr>
             <p:extLst>
               <p:ext uri="{D42A27DB-BD31-4B8C-83A1-F6EECF244321}">
-                <p14:modId xmlns:p14="http://schemas.microsoft.com/office/powerpoint/2010/main" val="898294432"/>
+                <p14:modId xmlns:p14="http://schemas.microsoft.com/office/powerpoint/2010/main" val="3920015584"/>
               </p:ext>
             </p:extLst>
           </p:nvPr>
@@ -7177,11 +7177,28 @@
                     <a:bodyPr/>
                     <a:lstStyle/>
                     <a:p>
+                      <a:pPr marL="0" marR="0" lvl="0" indent="0" algn="l" defTabSz="914400" rtl="0" eaLnBrk="1" fontAlgn="auto" latinLnBrk="0" hangingPunct="1">
+                        <a:lnSpc>
+                          <a:spcPct val="100000"/>
+                        </a:lnSpc>
+                        <a:spcBef>
+                          <a:spcPts val="0"/>
+                        </a:spcBef>
+                        <a:spcAft>
+                          <a:spcPts val="0"/>
+                        </a:spcAft>
+                        <a:buClrTx/>
+                        <a:buSzTx/>
+                        <a:buFontTx/>
+                        <a:buNone/>
+                        <a:tabLst/>
+                        <a:defRPr/>
+                      </a:pPr>
                       <a:r>
                         <a:rPr lang="en-US" dirty="0">
                           <a:latin typeface="Helvetica LT Std" panose="020B0504020202020204" pitchFamily="34" charset="0"/>
                         </a:rPr>
-                        <a:t>Slow</a:t>
+                        <a:t>Public key eliminates need to exchange private keys</a:t>
                       </a:r>
                     </a:p>
                   </a:txBody>
@@ -7233,7 +7250,7 @@
                         <a:rPr lang="en-US" dirty="0">
                           <a:latin typeface="Helvetica LT Std" panose="020B0504020202020204" pitchFamily="34" charset="0"/>
                         </a:rPr>
-                        <a:t>Public key eliminates need to exchange private keys</a:t>
+                        <a:t>Slow</a:t>
                       </a:r>
                     </a:p>
                   </a:txBody>
@@ -8959,9 +8976,35 @@
               </a:rPr>
               <a:t>3</a:t>
             </a:r>
-            <a:endParaRPr lang="en-US" dirty="0">
-              <a:latin typeface="Helvetica LT Std" panose="020B0504020202020204" pitchFamily="34" charset="0"/>
-            </a:endParaRPr>
+          </a:p>
+          <a:p>
+            <a:pPr marL="0" indent="0">
+              <a:lnSpc>
+                <a:spcPct val="100000"/>
+              </a:lnSpc>
+              <a:spcAft>
+                <a:spcPts val="600"/>
+              </a:spcAft>
+              <a:buNone/>
+            </a:pPr>
+            <a:r>
+              <a:rPr lang="en-US" dirty="0">
+                <a:latin typeface="Helvetica LT Std" panose="020B0504020202020204" pitchFamily="34" charset="0"/>
+              </a:rPr>
+              <a:t>Unlike, for example, </a:t>
+            </a:r>
+            <a:r>
+              <a:rPr lang="en-US" dirty="0" err="1">
+                <a:latin typeface="Helvetica LT Std" panose="020B0504020202020204" pitchFamily="34" charset="0"/>
+              </a:rPr>
+              <a:t>Keybase</a:t>
+            </a:r>
+            <a:r>
+              <a:rPr lang="en-US" dirty="0">
+                <a:latin typeface="Helvetica LT Std" panose="020B0504020202020204" pitchFamily="34" charset="0"/>
+              </a:rPr>
+              <a:t>, an alternative advertising end-to-end encryption but which is closed source and owned by Zoom.</a:t>
+            </a:r>
           </a:p>
         </p:txBody>
       </p:sp>

</xml_diff>